<commit_message>
2023-March-31 update. Slide corrected: corrected Linear with Logistic
</commit_message>
<xml_diff>
--- a/fraud_detection.pptx
+++ b/fraud_detection.pptx
@@ -211,7 +211,7 @@
           <a:p>
             <a:fld id="{D5E84897-7AE0-4D04-8734-549748834148}" type="datetimeFigureOut">
               <a:rPr lang="en-US" smtClean="0"/>
-              <a:t>3/30/2023</a:t>
+              <a:t>3/31/2023</a:t>
             </a:fld>
             <a:endParaRPr lang="en-US"/>
           </a:p>
@@ -1483,7 +1483,7 @@
           <a:p>
             <a:fld id="{3944FC4A-92AA-4E6F-88EA-2DA877A0B57F}" type="datetimeFigureOut">
               <a:rPr lang="en-US" smtClean="0"/>
-              <a:t>3/30/2023</a:t>
+              <a:t>3/31/2023</a:t>
             </a:fld>
             <a:endParaRPr lang="en-US"/>
           </a:p>
@@ -1684,7 +1684,7 @@
           <a:p>
             <a:fld id="{3944FC4A-92AA-4E6F-88EA-2DA877A0B57F}" type="datetimeFigureOut">
               <a:rPr lang="en-US" smtClean="0"/>
-              <a:t>3/30/2023</a:t>
+              <a:t>3/31/2023</a:t>
             </a:fld>
             <a:endParaRPr lang="en-US"/>
           </a:p>
@@ -1895,7 +1895,7 @@
           <a:p>
             <a:fld id="{3944FC4A-92AA-4E6F-88EA-2DA877A0B57F}" type="datetimeFigureOut">
               <a:rPr lang="en-US" smtClean="0"/>
-              <a:t>3/30/2023</a:t>
+              <a:t>3/31/2023</a:t>
             </a:fld>
             <a:endParaRPr lang="en-US"/>
           </a:p>
@@ -4428,7 +4428,7 @@
           <a:p>
             <a:fld id="{3944FC4A-92AA-4E6F-88EA-2DA877A0B57F}" type="datetimeFigureOut">
               <a:rPr lang="en-US" smtClean="0"/>
-              <a:t>3/30/2023</a:t>
+              <a:t>3/31/2023</a:t>
             </a:fld>
             <a:endParaRPr lang="en-US"/>
           </a:p>
@@ -4706,7 +4706,7 @@
           <a:p>
             <a:fld id="{3944FC4A-92AA-4E6F-88EA-2DA877A0B57F}" type="datetimeFigureOut">
               <a:rPr lang="en-US" smtClean="0"/>
-              <a:t>3/30/2023</a:t>
+              <a:t>3/31/2023</a:t>
             </a:fld>
             <a:endParaRPr lang="en-US"/>
           </a:p>
@@ -4974,7 +4974,7 @@
           <a:p>
             <a:fld id="{3944FC4A-92AA-4E6F-88EA-2DA877A0B57F}" type="datetimeFigureOut">
               <a:rPr lang="en-US" smtClean="0"/>
-              <a:t>3/30/2023</a:t>
+              <a:t>3/31/2023</a:t>
             </a:fld>
             <a:endParaRPr lang="en-US"/>
           </a:p>
@@ -5389,7 +5389,7 @@
           <a:p>
             <a:fld id="{3944FC4A-92AA-4E6F-88EA-2DA877A0B57F}" type="datetimeFigureOut">
               <a:rPr lang="en-US" smtClean="0"/>
-              <a:t>3/30/2023</a:t>
+              <a:t>3/31/2023</a:t>
             </a:fld>
             <a:endParaRPr lang="en-US"/>
           </a:p>
@@ -5533,7 +5533,7 @@
           <a:p>
             <a:fld id="{3944FC4A-92AA-4E6F-88EA-2DA877A0B57F}" type="datetimeFigureOut">
               <a:rPr lang="en-US" smtClean="0"/>
-              <a:t>3/30/2023</a:t>
+              <a:t>3/31/2023</a:t>
             </a:fld>
             <a:endParaRPr lang="en-US"/>
           </a:p>
@@ -5649,7 +5649,7 @@
           <a:p>
             <a:fld id="{3944FC4A-92AA-4E6F-88EA-2DA877A0B57F}" type="datetimeFigureOut">
               <a:rPr lang="en-US" smtClean="0"/>
-              <a:t>3/30/2023</a:t>
+              <a:t>3/31/2023</a:t>
             </a:fld>
             <a:endParaRPr lang="en-US"/>
           </a:p>
@@ -5963,7 +5963,7 @@
           <a:p>
             <a:fld id="{3944FC4A-92AA-4E6F-88EA-2DA877A0B57F}" type="datetimeFigureOut">
               <a:rPr lang="en-US" smtClean="0"/>
-              <a:t>3/30/2023</a:t>
+              <a:t>3/31/2023</a:t>
             </a:fld>
             <a:endParaRPr lang="en-US"/>
           </a:p>
@@ -6254,7 +6254,7 @@
           <a:p>
             <a:fld id="{3944FC4A-92AA-4E6F-88EA-2DA877A0B57F}" type="datetimeFigureOut">
               <a:rPr lang="en-US" smtClean="0"/>
-              <a:t>3/30/2023</a:t>
+              <a:t>3/31/2023</a:t>
             </a:fld>
             <a:endParaRPr lang="en-US"/>
           </a:p>
@@ -6498,7 +6498,7 @@
           <a:p>
             <a:fld id="{3944FC4A-92AA-4E6F-88EA-2DA877A0B57F}" type="datetimeFigureOut">
               <a:rPr lang="en-US" smtClean="0"/>
-              <a:t>3/30/2023</a:t>
+              <a:t>3/31/2023</a:t>
             </a:fld>
             <a:endParaRPr lang="en-US"/>
           </a:p>
@@ -9360,7 +9360,23 @@
                 </a:solidFill>
                 <a:ea typeface="ＭＳ Ｐゴシック" pitchFamily="50" charset="-128"/>
               </a:rPr>
-              <a:t>Linear Regression</a:t>
+              <a:t>Logistic</a:t>
+            </a:r>
+          </a:p>
+          <a:p>
+            <a:pPr algn="ctr">
+              <a:spcBef>
+                <a:spcPct val="0"/>
+              </a:spcBef>
+            </a:pPr>
+            <a:r>
+              <a:rPr lang="en-US" altLang="ja-JP" dirty="0">
+                <a:solidFill>
+                  <a:schemeClr val="bg1"/>
+                </a:solidFill>
+                <a:ea typeface="ＭＳ Ｐゴシック" pitchFamily="50" charset="-128"/>
+              </a:rPr>
+              <a:t>Regression</a:t>
             </a:r>
           </a:p>
         </p:txBody>

</xml_diff>

<commit_message>
2023-April-03 update. Definitive slides, deleted 1 to save time during presentation
</commit_message>
<xml_diff>
--- a/fraud_detection.pptx
+++ b/fraud_detection.pptx
@@ -5,7 +5,7 @@
     <p:sldMasterId id="2147483648" r:id="rId1"/>
   </p:sldMasterIdLst>
   <p:notesMasterIdLst>
-    <p:notesMasterId r:id="rId17"/>
+    <p:notesMasterId r:id="rId16"/>
   </p:notesMasterIdLst>
   <p:sldIdLst>
     <p:sldId id="1787" r:id="rId2"/>
@@ -20,9 +20,8 @@
     <p:sldId id="1799" r:id="rId11"/>
     <p:sldId id="1795" r:id="rId12"/>
     <p:sldId id="743" r:id="rId13"/>
-    <p:sldId id="1801" r:id="rId14"/>
-    <p:sldId id="1796" r:id="rId15"/>
-    <p:sldId id="282" r:id="rId16"/>
+    <p:sldId id="1796" r:id="rId14"/>
+    <p:sldId id="282" r:id="rId15"/>
   </p:sldIdLst>
   <p:sldSz cx="12192000" cy="6858000"/>
   <p:notesSz cx="6858000" cy="9144000"/>
@@ -211,7 +210,7 @@
           <a:p>
             <a:fld id="{D5E84897-7AE0-4D04-8734-549748834148}" type="datetimeFigureOut">
               <a:rPr lang="en-US" smtClean="0"/>
-              <a:t>3/31/2023</a:t>
+              <a:t>4/3/2023</a:t>
             </a:fld>
             <a:endParaRPr lang="en-US"/>
           </a:p>
@@ -980,12 +979,7 @@
             <p:ph type="sldImg"/>
           </p:nvPr>
         </p:nvSpPr>
-        <p:spPr>
-          <a:xfrm>
-            <a:off x="458788" y="720725"/>
-            <a:ext cx="6397625" cy="3598863"/>
-          </a:xfrm>
-        </p:spPr>
+        <p:spPr/>
       </p:sp>
       <p:sp>
         <p:nvSpPr>
@@ -1021,24 +1015,78 @@
           <a:bodyPr/>
           <a:lstStyle/>
           <a:p>
-            <a:pPr>
+            <a:pPr marL="0" marR="0" lvl="0" indent="0" algn="r" defTabSz="914400" rtl="0" eaLnBrk="1" fontAlgn="auto" latinLnBrk="0" hangingPunct="1">
+              <a:lnSpc>
+                <a:spcPct val="100000"/>
+              </a:lnSpc>
+              <a:spcBef>
+                <a:spcPts val="0"/>
+              </a:spcBef>
+              <a:spcAft>
+                <a:spcPts val="0"/>
+              </a:spcAft>
+              <a:buClrTx/>
+              <a:buSzTx/>
+              <a:buFontTx/>
+              <a:buNone/>
+              <a:tabLst/>
               <a:defRPr/>
             </a:pPr>
-            <a:fld id="{DB19E439-0A36-4389-B1D4-036D35E9F4EA}" type="slidenum">
-              <a:rPr lang="en-US" smtClean="0"/>
-              <a:pPr>
+            <a:fld id="{C0F4A2C8-6C88-4E71-83EE-698B9D4FE22F}" type="slidenum">
+              <a:rPr kumimoji="0" lang="en-US" sz="1200" b="0" i="0" u="none" strike="noStrike" kern="1200" cap="none" spc="0" normalizeH="0" baseline="0" noProof="0" smtClean="0">
+                <a:ln>
+                  <a:noFill/>
+                </a:ln>
+                <a:solidFill>
+                  <a:prstClr val="black"/>
+                </a:solidFill>
+                <a:effectLst/>
+                <a:uLnTx/>
+                <a:uFillTx/>
+                <a:latin typeface="Arial" panose="020B0604020202020204" pitchFamily="34" charset="0"/>
+                <a:ea typeface="+mn-ea"/>
+                <a:cs typeface="+mn-cs"/>
+              </a:rPr>
+              <a:pPr marL="0" marR="0" lvl="0" indent="0" algn="r" defTabSz="914400" rtl="0" eaLnBrk="1" fontAlgn="auto" latinLnBrk="0" hangingPunct="1">
+                <a:lnSpc>
+                  <a:spcPct val="100000"/>
+                </a:lnSpc>
+                <a:spcBef>
+                  <a:spcPts val="0"/>
+                </a:spcBef>
+                <a:spcAft>
+                  <a:spcPts val="0"/>
+                </a:spcAft>
+                <a:buClrTx/>
+                <a:buSzTx/>
+                <a:buFontTx/>
+                <a:buNone/>
+                <a:tabLst/>
                 <a:defRPr/>
               </a:pPr>
               <a:t>13</a:t>
             </a:fld>
-            <a:endParaRPr lang="en-US" dirty="0"/>
+            <a:endParaRPr kumimoji="0" lang="en-US" sz="1200" b="0" i="0" u="none" strike="noStrike" kern="1200" cap="none" spc="0" normalizeH="0" baseline="0" noProof="0" dirty="0">
+              <a:ln>
+                <a:noFill/>
+              </a:ln>
+              <a:solidFill>
+                <a:prstClr val="black"/>
+              </a:solidFill>
+              <a:effectLst/>
+              <a:uLnTx/>
+              <a:uFillTx/>
+              <a:latin typeface="Arial" panose="020B0604020202020204" pitchFamily="34" charset="0"/>
+              <a:ea typeface="+mn-ea"/>
+              <a:cs typeface="+mn-cs"/>
+            </a:endParaRPr>
           </a:p>
         </p:txBody>
       </p:sp>
     </p:spTree>
     <p:extLst>
       <p:ext uri="{BB962C8B-B14F-4D97-AF65-F5344CB8AC3E}">
-        <p14:creationId xmlns:p14="http://schemas.microsoft.com/office/powerpoint/2010/main" val="1330648192"/>
+        <p14:creationId xmlns:p14="http://schemas.microsoft.com/office/powerpoint/2010/main" val="2557606593"/>
       </p:ext>
     </p:extLst>
   </p:cSld>
@@ -1161,150 +1209,6 @@
                 <a:defRPr/>
               </a:pPr>
               <a:t>14</a:t>
-            </a:fld>
-            <a:endParaRPr kumimoji="0" lang="en-US" sz="1200" b="0" i="0" u="none" strike="noStrike" kern="1200" cap="none" spc="0" normalizeH="0" baseline="0" noProof="0" dirty="0">
-              <a:ln>
-                <a:noFill/>
-              </a:ln>
-              <a:solidFill>
-                <a:prstClr val="black"/>
-              </a:solidFill>
-              <a:effectLst/>
-              <a:uLnTx/>
-              <a:uFillTx/>
-              <a:latin typeface="Arial" panose="020B0604020202020204" pitchFamily="34" charset="0"/>
-              <a:ea typeface="+mn-ea"/>
-              <a:cs typeface="+mn-cs"/>
-            </a:endParaRPr>
-          </a:p>
-        </p:txBody>
-      </p:sp>
-    </p:spTree>
-    <p:extLst>
-      <p:ext uri="{BB962C8B-B14F-4D97-AF65-F5344CB8AC3E}">
-        <p14:creationId xmlns:p14="http://schemas.microsoft.com/office/powerpoint/2010/main" val="2557606593"/>
-      </p:ext>
-    </p:extLst>
-  </p:cSld>
-  <p:clrMapOvr>
-    <a:masterClrMapping/>
-  </p:clrMapOvr>
-</p:notes>
-</file>
-
-<file path=ppt/notesSlides/notesSlide8.xml><?xml version="1.0" encoding="utf-8"?>
-<p:notes xmlns:a="http://schemas.openxmlformats.org/drawingml/2006/main" xmlns:r="http://schemas.openxmlformats.org/officeDocument/2006/relationships" xmlns:p="http://schemas.openxmlformats.org/presentationml/2006/main">
-  <p:cSld>
-    <p:spTree>
-      <p:nvGrpSpPr>
-        <p:cNvPr id="1" name=""/>
-        <p:cNvGrpSpPr/>
-        <p:nvPr/>
-      </p:nvGrpSpPr>
-      <p:grpSpPr>
-        <a:xfrm>
-          <a:off x="0" y="0"/>
-          <a:ext cx="0" cy="0"/>
-          <a:chOff x="0" y="0"/>
-          <a:chExt cx="0" cy="0"/>
-        </a:xfrm>
-      </p:grpSpPr>
-      <p:sp>
-        <p:nvSpPr>
-          <p:cNvPr id="2" name="Slide Image Placeholder 1"/>
-          <p:cNvSpPr>
-            <a:spLocks noGrp="1" noRot="1" noChangeAspect="1"/>
-          </p:cNvSpPr>
-          <p:nvPr>
-            <p:ph type="sldImg"/>
-          </p:nvPr>
-        </p:nvSpPr>
-        <p:spPr/>
-      </p:sp>
-      <p:sp>
-        <p:nvSpPr>
-          <p:cNvPr id="3" name="Notes Placeholder 2"/>
-          <p:cNvSpPr>
-            <a:spLocks noGrp="1"/>
-          </p:cNvSpPr>
-          <p:nvPr>
-            <p:ph type="body" idx="1"/>
-          </p:nvPr>
-        </p:nvSpPr>
-        <p:spPr/>
-        <p:txBody>
-          <a:bodyPr/>
-          <a:lstStyle/>
-          <a:p>
-            <a:endParaRPr lang="en-US" dirty="0"/>
-          </a:p>
-        </p:txBody>
-      </p:sp>
-      <p:sp>
-        <p:nvSpPr>
-          <p:cNvPr id="4" name="Slide Number Placeholder 3"/>
-          <p:cNvSpPr>
-            <a:spLocks noGrp="1"/>
-          </p:cNvSpPr>
-          <p:nvPr>
-            <p:ph type="sldNum" sz="quarter" idx="10"/>
-          </p:nvPr>
-        </p:nvSpPr>
-        <p:spPr/>
-        <p:txBody>
-          <a:bodyPr/>
-          <a:lstStyle/>
-          <a:p>
-            <a:pPr marL="0" marR="0" lvl="0" indent="0" algn="r" defTabSz="914400" rtl="0" eaLnBrk="1" fontAlgn="auto" latinLnBrk="0" hangingPunct="1">
-              <a:lnSpc>
-                <a:spcPct val="100000"/>
-              </a:lnSpc>
-              <a:spcBef>
-                <a:spcPts val="0"/>
-              </a:spcBef>
-              <a:spcAft>
-                <a:spcPts val="0"/>
-              </a:spcAft>
-              <a:buClrTx/>
-              <a:buSzTx/>
-              <a:buFontTx/>
-              <a:buNone/>
-              <a:tabLst/>
-              <a:defRPr/>
-            </a:pPr>
-            <a:fld id="{C0F4A2C8-6C88-4E71-83EE-698B9D4FE22F}" type="slidenum">
-              <a:rPr kumimoji="0" lang="en-US" sz="1200" b="0" i="0" u="none" strike="noStrike" kern="1200" cap="none" spc="0" normalizeH="0" baseline="0" noProof="0" smtClean="0">
-                <a:ln>
-                  <a:noFill/>
-                </a:ln>
-                <a:solidFill>
-                  <a:prstClr val="black"/>
-                </a:solidFill>
-                <a:effectLst/>
-                <a:uLnTx/>
-                <a:uFillTx/>
-                <a:latin typeface="Arial" panose="020B0604020202020204" pitchFamily="34" charset="0"/>
-                <a:ea typeface="+mn-ea"/>
-                <a:cs typeface="+mn-cs"/>
-              </a:rPr>
-              <a:pPr marL="0" marR="0" lvl="0" indent="0" algn="r" defTabSz="914400" rtl="0" eaLnBrk="1" fontAlgn="auto" latinLnBrk="0" hangingPunct="1">
-                <a:lnSpc>
-                  <a:spcPct val="100000"/>
-                </a:lnSpc>
-                <a:spcBef>
-                  <a:spcPts val="0"/>
-                </a:spcBef>
-                <a:spcAft>
-                  <a:spcPts val="0"/>
-                </a:spcAft>
-                <a:buClrTx/>
-                <a:buSzTx/>
-                <a:buFontTx/>
-                <a:buNone/>
-                <a:tabLst/>
-                <a:defRPr/>
-              </a:pPr>
-              <a:t>15</a:t>
             </a:fld>
             <a:endParaRPr kumimoji="0" lang="en-US" sz="1200" b="0" i="0" u="none" strike="noStrike" kern="1200" cap="none" spc="0" normalizeH="0" baseline="0" noProof="0" dirty="0">
               <a:ln>
@@ -1483,7 +1387,7 @@
           <a:p>
             <a:fld id="{3944FC4A-92AA-4E6F-88EA-2DA877A0B57F}" type="datetimeFigureOut">
               <a:rPr lang="en-US" smtClean="0"/>
-              <a:t>3/31/2023</a:t>
+              <a:t>4/3/2023</a:t>
             </a:fld>
             <a:endParaRPr lang="en-US"/>
           </a:p>
@@ -1684,7 +1588,7 @@
           <a:p>
             <a:fld id="{3944FC4A-92AA-4E6F-88EA-2DA877A0B57F}" type="datetimeFigureOut">
               <a:rPr lang="en-US" smtClean="0"/>
-              <a:t>3/31/2023</a:t>
+              <a:t>4/3/2023</a:t>
             </a:fld>
             <a:endParaRPr lang="en-US"/>
           </a:p>
@@ -1895,7 +1799,7 @@
           <a:p>
             <a:fld id="{3944FC4A-92AA-4E6F-88EA-2DA877A0B57F}" type="datetimeFigureOut">
               <a:rPr lang="en-US" smtClean="0"/>
-              <a:t>3/31/2023</a:t>
+              <a:t>4/3/2023</a:t>
             </a:fld>
             <a:endParaRPr lang="en-US"/>
           </a:p>
@@ -4428,7 +4332,7 @@
           <a:p>
             <a:fld id="{3944FC4A-92AA-4E6F-88EA-2DA877A0B57F}" type="datetimeFigureOut">
               <a:rPr lang="en-US" smtClean="0"/>
-              <a:t>3/31/2023</a:t>
+              <a:t>4/3/2023</a:t>
             </a:fld>
             <a:endParaRPr lang="en-US"/>
           </a:p>
@@ -4706,7 +4610,7 @@
           <a:p>
             <a:fld id="{3944FC4A-92AA-4E6F-88EA-2DA877A0B57F}" type="datetimeFigureOut">
               <a:rPr lang="en-US" smtClean="0"/>
-              <a:t>3/31/2023</a:t>
+              <a:t>4/3/2023</a:t>
             </a:fld>
             <a:endParaRPr lang="en-US"/>
           </a:p>
@@ -4974,7 +4878,7 @@
           <a:p>
             <a:fld id="{3944FC4A-92AA-4E6F-88EA-2DA877A0B57F}" type="datetimeFigureOut">
               <a:rPr lang="en-US" smtClean="0"/>
-              <a:t>3/31/2023</a:t>
+              <a:t>4/3/2023</a:t>
             </a:fld>
             <a:endParaRPr lang="en-US"/>
           </a:p>
@@ -5389,7 +5293,7 @@
           <a:p>
             <a:fld id="{3944FC4A-92AA-4E6F-88EA-2DA877A0B57F}" type="datetimeFigureOut">
               <a:rPr lang="en-US" smtClean="0"/>
-              <a:t>3/31/2023</a:t>
+              <a:t>4/3/2023</a:t>
             </a:fld>
             <a:endParaRPr lang="en-US"/>
           </a:p>
@@ -5533,7 +5437,7 @@
           <a:p>
             <a:fld id="{3944FC4A-92AA-4E6F-88EA-2DA877A0B57F}" type="datetimeFigureOut">
               <a:rPr lang="en-US" smtClean="0"/>
-              <a:t>3/31/2023</a:t>
+              <a:t>4/3/2023</a:t>
             </a:fld>
             <a:endParaRPr lang="en-US"/>
           </a:p>
@@ -5649,7 +5553,7 @@
           <a:p>
             <a:fld id="{3944FC4A-92AA-4E6F-88EA-2DA877A0B57F}" type="datetimeFigureOut">
               <a:rPr lang="en-US" smtClean="0"/>
-              <a:t>3/31/2023</a:t>
+              <a:t>4/3/2023</a:t>
             </a:fld>
             <a:endParaRPr lang="en-US"/>
           </a:p>
@@ -5963,7 +5867,7 @@
           <a:p>
             <a:fld id="{3944FC4A-92AA-4E6F-88EA-2DA877A0B57F}" type="datetimeFigureOut">
               <a:rPr lang="en-US" smtClean="0"/>
-              <a:t>3/31/2023</a:t>
+              <a:t>4/3/2023</a:t>
             </a:fld>
             <a:endParaRPr lang="en-US"/>
           </a:p>
@@ -6254,7 +6158,7 @@
           <a:p>
             <a:fld id="{3944FC4A-92AA-4E6F-88EA-2DA877A0B57F}" type="datetimeFigureOut">
               <a:rPr lang="en-US" smtClean="0"/>
-              <a:t>3/31/2023</a:t>
+              <a:t>4/3/2023</a:t>
             </a:fld>
             <a:endParaRPr lang="en-US"/>
           </a:p>
@@ -6498,7 +6402,7 @@
           <a:p>
             <a:fld id="{3944FC4A-92AA-4E6F-88EA-2DA877A0B57F}" type="datetimeFigureOut">
               <a:rPr lang="en-US" smtClean="0"/>
-              <a:t>3/31/2023</a:t>
+              <a:t>4/3/2023</a:t>
             </a:fld>
             <a:endParaRPr lang="en-US"/>
           </a:p>
@@ -9726,544 +9630,6 @@
       </p:grpSpPr>
       <p:sp>
         <p:nvSpPr>
-          <p:cNvPr id="17" name="Rectangle 5"/>
-          <p:cNvSpPr>
-            <a:spLocks noChangeArrowheads="1"/>
-          </p:cNvSpPr>
-          <p:nvPr/>
-        </p:nvSpPr>
-        <p:spPr bwMode="auto">
-          <a:xfrm>
-            <a:off x="9084294" y="3725492"/>
-            <a:ext cx="2377440" cy="1166461"/>
-          </a:xfrm>
-          <a:prstGeom prst="rect">
-            <a:avLst/>
-          </a:prstGeom>
-          <a:solidFill>
-            <a:schemeClr val="bg2">
-              <a:lumMod val="50000"/>
-            </a:schemeClr>
-          </a:solidFill>
-          <a:ln w="12700" algn="ctr">
-            <a:solidFill>
-              <a:schemeClr val="tx1"/>
-            </a:solidFill>
-            <a:miter lim="800000"/>
-            <a:headEnd/>
-            <a:tailEnd/>
-          </a:ln>
-        </p:spPr>
-        <p:txBody>
-          <a:bodyPr wrap="square" lIns="88900" tIns="88900" rIns="88900" bIns="88900" anchor="ctr"/>
-          <a:lstStyle/>
-          <a:p>
-            <a:pPr algn="ctr">
-              <a:spcBef>
-                <a:spcPct val="0"/>
-              </a:spcBef>
-            </a:pPr>
-            <a:r>
-              <a:rPr lang="en-US" altLang="ja-JP" sz="1600" dirty="0">
-                <a:solidFill>
-                  <a:schemeClr val="bg1"/>
-                </a:solidFill>
-                <a:ea typeface="ＭＳ Ｐゴシック" pitchFamily="50" charset="-128"/>
-              </a:rPr>
-              <a:t>Of all the true Fraud predicted transactions, 81.14% were correctly predicted</a:t>
-            </a:r>
-          </a:p>
-        </p:txBody>
-      </p:sp>
-      <p:sp>
-        <p:nvSpPr>
-          <p:cNvPr id="21" name="Rectangle 9"/>
-          <p:cNvSpPr>
-            <a:spLocks noChangeArrowheads="1"/>
-          </p:cNvSpPr>
-          <p:nvPr/>
-        </p:nvSpPr>
-        <p:spPr bwMode="auto">
-          <a:xfrm>
-            <a:off x="9084294" y="1038432"/>
-            <a:ext cx="2377440" cy="822854"/>
-          </a:xfrm>
-          <a:prstGeom prst="rect">
-            <a:avLst/>
-          </a:prstGeom>
-          <a:solidFill>
-            <a:schemeClr val="bg2">
-              <a:lumMod val="50000"/>
-            </a:schemeClr>
-          </a:solidFill>
-          <a:ln w="12700" algn="ctr">
-            <a:solidFill>
-              <a:schemeClr val="tx1"/>
-            </a:solidFill>
-            <a:miter lim="800000"/>
-            <a:headEnd/>
-            <a:tailEnd/>
-          </a:ln>
-        </p:spPr>
-        <p:txBody>
-          <a:bodyPr wrap="square" lIns="88900" tIns="88900" rIns="88900" bIns="88900" anchor="ctr"/>
-          <a:lstStyle/>
-          <a:p>
-            <a:pPr algn="ctr">
-              <a:spcBef>
-                <a:spcPct val="0"/>
-              </a:spcBef>
-            </a:pPr>
-            <a:r>
-              <a:rPr lang="en-US" altLang="ja-JP" sz="1600" dirty="0">
-                <a:solidFill>
-                  <a:schemeClr val="bg1"/>
-                </a:solidFill>
-                <a:ea typeface="ＭＳ Ｐゴシック" pitchFamily="50" charset="-128"/>
-              </a:rPr>
-              <a:t>Correctly predicts Fraud transactions by 97.87% from both classes</a:t>
-            </a:r>
-          </a:p>
-        </p:txBody>
-      </p:sp>
-      <p:sp>
-        <p:nvSpPr>
-          <p:cNvPr id="13" name="Oval 11">
-            <a:extLst>
-              <a:ext uri="{FF2B5EF4-FFF2-40B4-BE49-F238E27FC236}">
-                <a16:creationId xmlns:a16="http://schemas.microsoft.com/office/drawing/2014/main" id="{B2D1E87E-F45D-4B99-A1D3-784B8AA2AF6E}"/>
-              </a:ext>
-            </a:extLst>
-          </p:cNvPr>
-          <p:cNvSpPr>
-            <a:spLocks noChangeArrowheads="1"/>
-          </p:cNvSpPr>
-          <p:nvPr/>
-        </p:nvSpPr>
-        <p:spPr bwMode="auto">
-          <a:xfrm>
-            <a:off x="6627854" y="2520675"/>
-            <a:ext cx="1828800" cy="1828800"/>
-          </a:xfrm>
-          <a:prstGeom prst="ellipse">
-            <a:avLst/>
-          </a:prstGeom>
-          <a:solidFill>
-            <a:srgbClr val="CC0066"/>
-          </a:solidFill>
-          <a:ln w="12700">
-            <a:noFill/>
-            <a:prstDash val="sysDot"/>
-            <a:round/>
-            <a:headEnd/>
-            <a:tailEnd/>
-          </a:ln>
-        </p:spPr>
-        <p:txBody>
-          <a:bodyPr wrap="square" lIns="88900" tIns="88900" rIns="88900" bIns="88900" anchor="ctr"/>
-          <a:lstStyle/>
-          <a:p>
-            <a:pPr algn="ctr">
-              <a:spcBef>
-                <a:spcPct val="0"/>
-              </a:spcBef>
-            </a:pPr>
-            <a:r>
-              <a:rPr lang="es-MX" altLang="ja-JP" dirty="0" err="1">
-                <a:solidFill>
-                  <a:schemeClr val="bg1"/>
-                </a:solidFill>
-                <a:ea typeface="ＭＳ Ｐゴシック" pitchFamily="50" charset="-128"/>
-              </a:rPr>
-              <a:t>Random</a:t>
-            </a:r>
-            <a:r>
-              <a:rPr lang="es-MX" altLang="ja-JP" dirty="0">
-                <a:solidFill>
-                  <a:schemeClr val="bg1"/>
-                </a:solidFill>
-                <a:ea typeface="ＭＳ Ｐゴシック" pitchFamily="50" charset="-128"/>
-              </a:rPr>
-              <a:t> Forest </a:t>
-            </a:r>
-            <a:r>
-              <a:rPr lang="es-MX" altLang="ja-JP" dirty="0" err="1">
-                <a:solidFill>
-                  <a:schemeClr val="bg1"/>
-                </a:solidFill>
-                <a:ea typeface="ＭＳ Ｐゴシック" pitchFamily="50" charset="-128"/>
-              </a:rPr>
-              <a:t>Classifier</a:t>
-            </a:r>
-            <a:endParaRPr lang="en-US" altLang="ja-JP" dirty="0">
-              <a:solidFill>
-                <a:schemeClr val="bg1"/>
-              </a:solidFill>
-              <a:ea typeface="ＭＳ Ｐゴシック" pitchFamily="50" charset="-128"/>
-            </a:endParaRPr>
-          </a:p>
-        </p:txBody>
-      </p:sp>
-      <p:sp>
-        <p:nvSpPr>
-          <p:cNvPr id="28" name="Rectangle 5">
-            <a:extLst>
-              <a:ext uri="{FF2B5EF4-FFF2-40B4-BE49-F238E27FC236}">
-                <a16:creationId xmlns:a16="http://schemas.microsoft.com/office/drawing/2014/main" id="{E7E5BFFE-7251-4759-91D4-A799EDB763B9}"/>
-              </a:ext>
-            </a:extLst>
-          </p:cNvPr>
-          <p:cNvSpPr>
-            <a:spLocks noChangeArrowheads="1"/>
-          </p:cNvSpPr>
-          <p:nvPr/>
-        </p:nvSpPr>
-        <p:spPr bwMode="auto">
-          <a:xfrm>
-            <a:off x="9084294" y="2152901"/>
-            <a:ext cx="2377440" cy="842613"/>
-          </a:xfrm>
-          <a:prstGeom prst="rect">
-            <a:avLst/>
-          </a:prstGeom>
-          <a:solidFill>
-            <a:schemeClr val="bg2">
-              <a:lumMod val="50000"/>
-            </a:schemeClr>
-          </a:solidFill>
-          <a:ln w="12700" algn="ctr">
-            <a:solidFill>
-              <a:schemeClr val="tx1"/>
-            </a:solidFill>
-            <a:miter lim="800000"/>
-            <a:headEnd/>
-            <a:tailEnd/>
-          </a:ln>
-        </p:spPr>
-        <p:txBody>
-          <a:bodyPr wrap="square" lIns="88900" tIns="88900" rIns="88900" bIns="88900" anchor="ctr"/>
-          <a:lstStyle/>
-          <a:p>
-            <a:pPr algn="ctr">
-              <a:spcBef>
-                <a:spcPct val="0"/>
-              </a:spcBef>
-            </a:pPr>
-            <a:r>
-              <a:rPr lang="en-US" altLang="ja-JP" sz="1600" dirty="0">
-                <a:solidFill>
-                  <a:schemeClr val="bg1"/>
-                </a:solidFill>
-                <a:ea typeface="ＭＳ Ｐゴシック" pitchFamily="50" charset="-128"/>
-              </a:rPr>
-              <a:t>Of all the Fraud predicted transactions, 99.97% were truly Fraud</a:t>
-            </a:r>
-          </a:p>
-        </p:txBody>
-      </p:sp>
-      <p:sp>
-        <p:nvSpPr>
-          <p:cNvPr id="84" name="Rectangle 5">
-            <a:extLst>
-              <a:ext uri="{FF2B5EF4-FFF2-40B4-BE49-F238E27FC236}">
-                <a16:creationId xmlns:a16="http://schemas.microsoft.com/office/drawing/2014/main" id="{8B3E5E27-C746-4732-9722-55FA5C1F9BE5}"/>
-              </a:ext>
-            </a:extLst>
-          </p:cNvPr>
-          <p:cNvSpPr>
-            <a:spLocks noChangeArrowheads="1"/>
-          </p:cNvSpPr>
-          <p:nvPr/>
-        </p:nvSpPr>
-        <p:spPr bwMode="auto">
-          <a:xfrm>
-            <a:off x="9084294" y="5203773"/>
-            <a:ext cx="2377440" cy="583230"/>
-          </a:xfrm>
-          <a:prstGeom prst="rect">
-            <a:avLst/>
-          </a:prstGeom>
-          <a:solidFill>
-            <a:schemeClr val="bg2">
-              <a:lumMod val="50000"/>
-            </a:schemeClr>
-          </a:solidFill>
-          <a:ln w="12700" algn="ctr">
-            <a:solidFill>
-              <a:schemeClr val="tx1"/>
-            </a:solidFill>
-            <a:miter lim="800000"/>
-            <a:headEnd/>
-            <a:tailEnd/>
-          </a:ln>
-        </p:spPr>
-        <p:txBody>
-          <a:bodyPr wrap="square" lIns="88900" tIns="88900" rIns="88900" bIns="88900" anchor="ctr"/>
-          <a:lstStyle/>
-          <a:p>
-            <a:pPr algn="ctr">
-              <a:spcBef>
-                <a:spcPct val="0"/>
-              </a:spcBef>
-            </a:pPr>
-            <a:r>
-              <a:rPr lang="en-US" altLang="ja-JP" sz="1600" dirty="0">
-                <a:solidFill>
-                  <a:schemeClr val="bg1"/>
-                </a:solidFill>
-                <a:ea typeface="ＭＳ Ｐゴシック" pitchFamily="50" charset="-128"/>
-              </a:rPr>
-              <a:t>F1-Score of 89.58%</a:t>
-            </a:r>
-          </a:p>
-        </p:txBody>
-      </p:sp>
-      <p:pic>
-        <p:nvPicPr>
-          <p:cNvPr id="14" name="Picture 13">
-            <a:extLst>
-              <a:ext uri="{FF2B5EF4-FFF2-40B4-BE49-F238E27FC236}">
-                <a16:creationId xmlns:a16="http://schemas.microsoft.com/office/drawing/2014/main" id="{AF7C270E-A7FB-4941-B436-17DD0935EE31}"/>
-              </a:ext>
-            </a:extLst>
-          </p:cNvPr>
-          <p:cNvPicPr>
-            <a:picLocks noChangeAspect="1"/>
-          </p:cNvPicPr>
-          <p:nvPr/>
-        </p:nvPicPr>
-        <p:blipFill rotWithShape="1">
-          <a:blip r:embed="rId3"/>
-          <a:srcRect l="19810" t="18533" r="24429" b="9855"/>
-          <a:stretch/>
-        </p:blipFill>
-        <p:spPr>
-          <a:xfrm>
-            <a:off x="442216" y="1377616"/>
-            <a:ext cx="5679307" cy="4102768"/>
-          </a:xfrm>
-          <a:prstGeom prst="rect">
-            <a:avLst/>
-          </a:prstGeom>
-          <a:ln>
-            <a:solidFill>
-              <a:schemeClr val="tx1"/>
-            </a:solidFill>
-          </a:ln>
-        </p:spPr>
-      </p:pic>
-      <p:cxnSp>
-        <p:nvCxnSpPr>
-          <p:cNvPr id="6" name="Straight Connector 5">
-            <a:extLst>
-              <a:ext uri="{FF2B5EF4-FFF2-40B4-BE49-F238E27FC236}">
-                <a16:creationId xmlns:a16="http://schemas.microsoft.com/office/drawing/2014/main" id="{B7CC3C23-80B7-480F-9084-06A99D8EDBB5}"/>
-              </a:ext>
-            </a:extLst>
-          </p:cNvPr>
-          <p:cNvCxnSpPr>
-            <a:stCxn id="13" idx="7"/>
-            <a:endCxn id="21" idx="1"/>
-          </p:cNvCxnSpPr>
-          <p:nvPr/>
-        </p:nvCxnSpPr>
-        <p:spPr>
-          <a:xfrm flipV="1">
-            <a:off x="8188832" y="1449859"/>
-            <a:ext cx="895462" cy="1338638"/>
-          </a:xfrm>
-          <a:prstGeom prst="line">
-            <a:avLst/>
-          </a:prstGeom>
-          <a:ln>
-            <a:solidFill>
-              <a:srgbClr val="CC0066"/>
-            </a:solidFill>
-          </a:ln>
-        </p:spPr>
-        <p:style>
-          <a:lnRef idx="1">
-            <a:schemeClr val="accent1"/>
-          </a:lnRef>
-          <a:fillRef idx="0">
-            <a:schemeClr val="accent1"/>
-          </a:fillRef>
-          <a:effectRef idx="0">
-            <a:schemeClr val="accent1"/>
-          </a:effectRef>
-          <a:fontRef idx="minor">
-            <a:schemeClr val="tx1"/>
-          </a:fontRef>
-        </p:style>
-      </p:cxnSp>
-      <p:cxnSp>
-        <p:nvCxnSpPr>
-          <p:cNvPr id="8" name="Straight Connector 7">
-            <a:extLst>
-              <a:ext uri="{FF2B5EF4-FFF2-40B4-BE49-F238E27FC236}">
-                <a16:creationId xmlns:a16="http://schemas.microsoft.com/office/drawing/2014/main" id="{63F3DEC1-AE99-4896-81D0-E7CCCF40F947}"/>
-              </a:ext>
-            </a:extLst>
-          </p:cNvPr>
-          <p:cNvCxnSpPr>
-            <a:stCxn id="13" idx="6"/>
-            <a:endCxn id="28" idx="1"/>
-          </p:cNvCxnSpPr>
-          <p:nvPr/>
-        </p:nvCxnSpPr>
-        <p:spPr>
-          <a:xfrm flipV="1">
-            <a:off x="8456654" y="2574208"/>
-            <a:ext cx="627640" cy="860867"/>
-          </a:xfrm>
-          <a:prstGeom prst="line">
-            <a:avLst/>
-          </a:prstGeom>
-          <a:ln>
-            <a:solidFill>
-              <a:srgbClr val="CC0066"/>
-            </a:solidFill>
-          </a:ln>
-        </p:spPr>
-        <p:style>
-          <a:lnRef idx="1">
-            <a:schemeClr val="accent1"/>
-          </a:lnRef>
-          <a:fillRef idx="0">
-            <a:schemeClr val="accent1"/>
-          </a:fillRef>
-          <a:effectRef idx="0">
-            <a:schemeClr val="accent1"/>
-          </a:effectRef>
-          <a:fontRef idx="minor">
-            <a:schemeClr val="tx1"/>
-          </a:fontRef>
-        </p:style>
-      </p:cxnSp>
-      <p:cxnSp>
-        <p:nvCxnSpPr>
-          <p:cNvPr id="10" name="Straight Connector 9">
-            <a:extLst>
-              <a:ext uri="{FF2B5EF4-FFF2-40B4-BE49-F238E27FC236}">
-                <a16:creationId xmlns:a16="http://schemas.microsoft.com/office/drawing/2014/main" id="{7811C38F-CA34-4504-BC36-35C635F063FD}"/>
-              </a:ext>
-            </a:extLst>
-          </p:cNvPr>
-          <p:cNvCxnSpPr>
-            <a:stCxn id="13" idx="6"/>
-            <a:endCxn id="17" idx="1"/>
-          </p:cNvCxnSpPr>
-          <p:nvPr/>
-        </p:nvCxnSpPr>
-        <p:spPr>
-          <a:xfrm>
-            <a:off x="8456654" y="3435075"/>
-            <a:ext cx="627640" cy="873648"/>
-          </a:xfrm>
-          <a:prstGeom prst="line">
-            <a:avLst/>
-          </a:prstGeom>
-          <a:ln>
-            <a:solidFill>
-              <a:srgbClr val="CC0066"/>
-            </a:solidFill>
-          </a:ln>
-        </p:spPr>
-        <p:style>
-          <a:lnRef idx="1">
-            <a:schemeClr val="accent1"/>
-          </a:lnRef>
-          <a:fillRef idx="0">
-            <a:schemeClr val="accent1"/>
-          </a:fillRef>
-          <a:effectRef idx="0">
-            <a:schemeClr val="accent1"/>
-          </a:effectRef>
-          <a:fontRef idx="minor">
-            <a:schemeClr val="tx1"/>
-          </a:fontRef>
-        </p:style>
-      </p:cxnSp>
-      <p:cxnSp>
-        <p:nvCxnSpPr>
-          <p:cNvPr id="12" name="Straight Connector 11">
-            <a:extLst>
-              <a:ext uri="{FF2B5EF4-FFF2-40B4-BE49-F238E27FC236}">
-                <a16:creationId xmlns:a16="http://schemas.microsoft.com/office/drawing/2014/main" id="{73C115B1-5906-45A2-BEA1-CFAF4EBE555F}"/>
-              </a:ext>
-            </a:extLst>
-          </p:cNvPr>
-          <p:cNvCxnSpPr>
-            <a:cxnSpLocks/>
-            <a:stCxn id="13" idx="5"/>
-            <a:endCxn id="84" idx="1"/>
-          </p:cNvCxnSpPr>
-          <p:nvPr/>
-        </p:nvCxnSpPr>
-        <p:spPr>
-          <a:xfrm>
-            <a:off x="8188832" y="4081653"/>
-            <a:ext cx="895462" cy="1413735"/>
-          </a:xfrm>
-          <a:prstGeom prst="line">
-            <a:avLst/>
-          </a:prstGeom>
-          <a:ln>
-            <a:solidFill>
-              <a:srgbClr val="CC0066"/>
-            </a:solidFill>
-          </a:ln>
-        </p:spPr>
-        <p:style>
-          <a:lnRef idx="1">
-            <a:schemeClr val="accent1"/>
-          </a:lnRef>
-          <a:fillRef idx="0">
-            <a:schemeClr val="accent1"/>
-          </a:fillRef>
-          <a:effectRef idx="0">
-            <a:schemeClr val="accent1"/>
-          </a:effectRef>
-          <a:fontRef idx="minor">
-            <a:schemeClr val="tx1"/>
-          </a:fontRef>
-        </p:style>
-      </p:cxnSp>
-    </p:spTree>
-    <p:extLst>
-      <p:ext uri="{BB962C8B-B14F-4D97-AF65-F5344CB8AC3E}">
-        <p14:creationId xmlns:p14="http://schemas.microsoft.com/office/powerpoint/2010/main" val="2310656867"/>
-      </p:ext>
-    </p:extLst>
-  </p:cSld>
-  <p:clrMapOvr>
-    <a:masterClrMapping/>
-  </p:clrMapOvr>
-  <p:transition spd="slow">
-    <p:push dir="u"/>
-  </p:transition>
-</p:sld>
-</file>
-
-<file path=ppt/slides/slide14.xml><?xml version="1.0" encoding="utf-8"?>
-<p:sld xmlns:a="http://schemas.openxmlformats.org/drawingml/2006/main" xmlns:r="http://schemas.openxmlformats.org/officeDocument/2006/relationships" xmlns:p="http://schemas.openxmlformats.org/presentationml/2006/main">
-  <p:cSld>
-    <p:spTree>
-      <p:nvGrpSpPr>
-        <p:cNvPr id="1" name=""/>
-        <p:cNvGrpSpPr/>
-        <p:nvPr/>
-      </p:nvGrpSpPr>
-      <p:grpSpPr>
-        <a:xfrm>
-          <a:off x="0" y="0"/>
-          <a:ext cx="0" cy="0"/>
-          <a:chOff x="0" y="0"/>
-          <a:chExt cx="0" cy="0"/>
-        </a:xfrm>
-      </p:grpSpPr>
-      <p:sp>
-        <p:nvSpPr>
           <p:cNvPr id="8" name="Title 7">
             <a:extLst>
               <a:ext uri="{FF2B5EF4-FFF2-40B4-BE49-F238E27FC236}">
@@ -10316,7 +9682,7 @@
 </p:sld>
 </file>
 
-<file path=ppt/slides/slide15.xml><?xml version="1.0" encoding="utf-8"?>
+<file path=ppt/slides/slide14.xml><?xml version="1.0" encoding="utf-8"?>
 <p:sld xmlns:a="http://schemas.openxmlformats.org/drawingml/2006/main" xmlns:r="http://schemas.openxmlformats.org/officeDocument/2006/relationships" xmlns:p="http://schemas.openxmlformats.org/presentationml/2006/main">
   <p:cSld>
     <p:spTree>

</xml_diff>